<commit_message>
Cambio en la imagen de presentación del portafolio radio-moderna
</commit_message>
<xml_diff>
--- a/portafolios/Imagenes-Radio/Logo.pptx
+++ b/portafolios/Imagenes-Radio/Logo.pptx
@@ -10,6 +10,7 @@
     <p:sldId id="258" r:id="rId4"/>
     <p:sldId id="259" r:id="rId5"/>
     <p:sldId id="260" r:id="rId6"/>
+    <p:sldId id="261" r:id="rId7"/>
   </p:sldIdLst>
   <p:sldSz cx="12192000" cy="6858000"/>
   <p:notesSz cx="6858000" cy="9144000"/>
@@ -116,6 +117,18 @@
 </p:presentation>
 </file>
 
+<file path=ppt/commentAuthors.xml><?xml version="1.0" encoding="utf-8"?>
+<p:cmAuthorLst xmlns:a="http://schemas.openxmlformats.org/drawingml/2006/main" xmlns:r="http://schemas.openxmlformats.org/officeDocument/2006/relationships" xmlns:p="http://schemas.openxmlformats.org/presentationml/2006/main">
+  <p:cmAuthor id="1" name="DANDY MATEO HUAMAN MURGA" initials="DMHM" lastIdx="1" clrIdx="0">
+    <p:extLst>
+      <p:ext uri="{19B8F6BF-5375-455C-9EA6-DF929625EA0E}">
+        <p15:presenceInfo xmlns:p15="http://schemas.microsoft.com/office/powerpoint/2012/main" userId="2616eef732804e70" providerId="Windows Live"/>
+      </p:ext>
+    </p:extLst>
+  </p:cmAuthor>
+</p:cmAuthorLst>
+</file>
+
 <file path=ppt/slideLayouts/slideLayout1.xml><?xml version="1.0" encoding="utf-8"?>
 <p:sldLayout xmlns:a="http://schemas.openxmlformats.org/drawingml/2006/main" xmlns:r="http://schemas.openxmlformats.org/officeDocument/2006/relationships" xmlns:p="http://schemas.openxmlformats.org/presentationml/2006/main" type="title" preserve="1">
   <p:cSld name="Diapositiva de título">
@@ -249,7 +262,7 @@
           <a:p>
             <a:fld id="{F626FB02-9259-4B25-9D6C-1F7186B439D0}" type="datetimeFigureOut">
               <a:rPr lang="es-PE" smtClean="0"/>
-              <a:t>8/05/2020</a:t>
+              <a:t>9/05/2020</a:t>
             </a:fld>
             <a:endParaRPr lang="es-PE"/>
           </a:p>
@@ -536,7 +549,7 @@
           <a:p>
             <a:fld id="{F626FB02-9259-4B25-9D6C-1F7186B439D0}" type="datetimeFigureOut">
               <a:rPr lang="es-PE" smtClean="0"/>
-              <a:t>8/05/2020</a:t>
+              <a:t>9/05/2020</a:t>
             </a:fld>
             <a:endParaRPr lang="es-PE"/>
           </a:p>
@@ -728,7 +741,7 @@
           <a:p>
             <a:fld id="{F626FB02-9259-4B25-9D6C-1F7186B439D0}" type="datetimeFigureOut">
               <a:rPr lang="es-PE" smtClean="0"/>
-              <a:t>8/05/2020</a:t>
+              <a:t>9/05/2020</a:t>
             </a:fld>
             <a:endParaRPr lang="es-PE"/>
           </a:p>
@@ -989,7 +1002,7 @@
           <a:p>
             <a:fld id="{F626FB02-9259-4B25-9D6C-1F7186B439D0}" type="datetimeFigureOut">
               <a:rPr lang="es-PE" smtClean="0"/>
-              <a:t>8/05/2020</a:t>
+              <a:t>9/05/2020</a:t>
             </a:fld>
             <a:endParaRPr lang="es-PE"/>
           </a:p>
@@ -1413,7 +1426,7 @@
           <a:p>
             <a:fld id="{F626FB02-9259-4B25-9D6C-1F7186B439D0}" type="datetimeFigureOut">
               <a:rPr lang="es-PE" smtClean="0"/>
-              <a:t>8/05/2020</a:t>
+              <a:t>9/05/2020</a:t>
             </a:fld>
             <a:endParaRPr lang="es-PE"/>
           </a:p>
@@ -1959,7 +1972,7 @@
           <a:p>
             <a:fld id="{F626FB02-9259-4B25-9D6C-1F7186B439D0}" type="datetimeFigureOut">
               <a:rPr lang="es-PE" smtClean="0"/>
-              <a:t>8/05/2020</a:t>
+              <a:t>9/05/2020</a:t>
             </a:fld>
             <a:endParaRPr lang="es-PE"/>
           </a:p>
@@ -2799,7 +2812,7 @@
           <a:p>
             <a:fld id="{F626FB02-9259-4B25-9D6C-1F7186B439D0}" type="datetimeFigureOut">
               <a:rPr lang="es-PE" smtClean="0"/>
-              <a:t>8/05/2020</a:t>
+              <a:t>9/05/2020</a:t>
             </a:fld>
             <a:endParaRPr lang="es-PE"/>
           </a:p>
@@ -2969,7 +2982,7 @@
           <a:p>
             <a:fld id="{F626FB02-9259-4B25-9D6C-1F7186B439D0}" type="datetimeFigureOut">
               <a:rPr lang="es-PE" smtClean="0"/>
-              <a:t>8/05/2020</a:t>
+              <a:t>9/05/2020</a:t>
             </a:fld>
             <a:endParaRPr lang="es-PE"/>
           </a:p>
@@ -3153,7 +3166,7 @@
           <a:p>
             <a:fld id="{F626FB02-9259-4B25-9D6C-1F7186B439D0}" type="datetimeFigureOut">
               <a:rPr lang="es-PE" smtClean="0"/>
-              <a:t>8/05/2020</a:t>
+              <a:t>9/05/2020</a:t>
             </a:fld>
             <a:endParaRPr lang="es-PE"/>
           </a:p>
@@ -3323,7 +3336,7 @@
           <a:p>
             <a:fld id="{F626FB02-9259-4B25-9D6C-1F7186B439D0}" type="datetimeFigureOut">
               <a:rPr lang="es-PE" smtClean="0"/>
-              <a:t>8/05/2020</a:t>
+              <a:t>9/05/2020</a:t>
             </a:fld>
             <a:endParaRPr lang="es-PE"/>
           </a:p>
@@ -3571,7 +3584,7 @@
           <a:p>
             <a:fld id="{F626FB02-9259-4B25-9D6C-1F7186B439D0}" type="datetimeFigureOut">
               <a:rPr lang="es-PE" smtClean="0"/>
-              <a:t>8/05/2020</a:t>
+              <a:t>9/05/2020</a:t>
             </a:fld>
             <a:endParaRPr lang="es-PE"/>
           </a:p>
@@ -3808,7 +3821,7 @@
           <a:p>
             <a:fld id="{F626FB02-9259-4B25-9D6C-1F7186B439D0}" type="datetimeFigureOut">
               <a:rPr lang="es-PE" smtClean="0"/>
-              <a:t>8/05/2020</a:t>
+              <a:t>9/05/2020</a:t>
             </a:fld>
             <a:endParaRPr lang="es-PE"/>
           </a:p>
@@ -4181,7 +4194,7 @@
           <a:p>
             <a:fld id="{F626FB02-9259-4B25-9D6C-1F7186B439D0}" type="datetimeFigureOut">
               <a:rPr lang="es-PE" smtClean="0"/>
-              <a:t>8/05/2020</a:t>
+              <a:t>9/05/2020</a:t>
             </a:fld>
             <a:endParaRPr lang="es-PE"/>
           </a:p>
@@ -4299,7 +4312,7 @@
           <a:p>
             <a:fld id="{F626FB02-9259-4B25-9D6C-1F7186B439D0}" type="datetimeFigureOut">
               <a:rPr lang="es-PE" smtClean="0"/>
-              <a:t>8/05/2020</a:t>
+              <a:t>9/05/2020</a:t>
             </a:fld>
             <a:endParaRPr lang="es-PE"/>
           </a:p>
@@ -4394,7 +4407,7 @@
           <a:p>
             <a:fld id="{F626FB02-9259-4B25-9D6C-1F7186B439D0}" type="datetimeFigureOut">
               <a:rPr lang="es-PE" smtClean="0"/>
-              <a:t>8/05/2020</a:t>
+              <a:t>9/05/2020</a:t>
             </a:fld>
             <a:endParaRPr lang="es-PE"/>
           </a:p>
@@ -4645,7 +4658,7 @@
           <a:p>
             <a:fld id="{F626FB02-9259-4B25-9D6C-1F7186B439D0}" type="datetimeFigureOut">
               <a:rPr lang="es-PE" smtClean="0"/>
-              <a:t>8/05/2020</a:t>
+              <a:t>9/05/2020</a:t>
             </a:fld>
             <a:endParaRPr lang="es-PE"/>
           </a:p>
@@ -4932,7 +4945,7 @@
           <a:p>
             <a:fld id="{F626FB02-9259-4B25-9D6C-1F7186B439D0}" type="datetimeFigureOut">
               <a:rPr lang="es-PE" smtClean="0"/>
-              <a:t>8/05/2020</a:t>
+              <a:t>9/05/2020</a:t>
             </a:fld>
             <a:endParaRPr lang="es-PE"/>
           </a:p>
@@ -5145,7 +5158,7 @@
           <a:p>
             <a:fld id="{F626FB02-9259-4B25-9D6C-1F7186B439D0}" type="datetimeFigureOut">
               <a:rPr lang="es-PE" smtClean="0"/>
-              <a:t>8/05/2020</a:t>
+              <a:t>9/05/2020</a:t>
             </a:fld>
             <a:endParaRPr lang="es-PE"/>
           </a:p>
@@ -6304,6 +6317,45 @@
           </a:prstGeom>
         </p:spPr>
       </p:pic>
+      <p:pic>
+        <p:nvPicPr>
+          <p:cNvPr id="3" name="Imagen 2">
+            <a:extLst>
+              <a:ext uri="{FF2B5EF4-FFF2-40B4-BE49-F238E27FC236}">
+                <a16:creationId xmlns:a16="http://schemas.microsoft.com/office/drawing/2014/main" id="{FBBEBEFA-C205-44AC-8AEC-8AFEFBCC8982}"/>
+              </a:ext>
+            </a:extLst>
+          </p:cNvPr>
+          <p:cNvPicPr>
+            <a:picLocks noChangeAspect="1"/>
+          </p:cNvPicPr>
+          <p:nvPr/>
+        </p:nvPicPr>
+        <p:blipFill>
+          <a:blip r:embed="rId4">
+            <a:extLst>
+              <a:ext uri="{28A0092B-C50C-407E-A947-70E740481C1C}">
+                <a14:useLocalDpi xmlns:a14="http://schemas.microsoft.com/office/drawing/2010/main" val="0"/>
+              </a:ext>
+            </a:extLst>
+          </a:blip>
+          <a:stretch>
+            <a:fillRect/>
+          </a:stretch>
+        </p:blipFill>
+        <p:spPr>
+          <a:xfrm>
+            <a:off x="5905500" y="247650"/>
+            <a:ext cx="5359398" cy="5405647"/>
+          </a:xfrm>
+          <a:prstGeom prst="rect">
+            <a:avLst/>
+          </a:prstGeom>
+          <a:effectLst>
+            <a:softEdge rad="635000"/>
+          </a:effectLst>
+        </p:spPr>
+      </p:pic>
     </p:spTree>
     <p:extLst>
       <p:ext uri="{BB962C8B-B14F-4D97-AF65-F5344CB8AC3E}">
@@ -6485,6 +6537,314 @@
     <p:extLst>
       <p:ext uri="{BB962C8B-B14F-4D97-AF65-F5344CB8AC3E}">
         <p14:creationId xmlns:p14="http://schemas.microsoft.com/office/powerpoint/2010/main" val="3911687426"/>
+      </p:ext>
+    </p:extLst>
+  </p:cSld>
+  <p:clrMapOvr>
+    <a:masterClrMapping/>
+  </p:clrMapOvr>
+</p:sld>
+</file>
+
+<file path=ppt/slides/slide6.xml><?xml version="1.0" encoding="utf-8"?>
+<p:sld xmlns:a="http://schemas.openxmlformats.org/drawingml/2006/main" xmlns:r="http://schemas.openxmlformats.org/officeDocument/2006/relationships" xmlns:p="http://schemas.openxmlformats.org/presentationml/2006/main">
+  <p:cSld>
+    <p:spTree>
+      <p:nvGrpSpPr>
+        <p:cNvPr id="1" name=""/>
+        <p:cNvGrpSpPr/>
+        <p:nvPr/>
+      </p:nvGrpSpPr>
+      <p:grpSpPr>
+        <a:xfrm>
+          <a:off x="0" y="0"/>
+          <a:ext cx="0" cy="0"/>
+          <a:chOff x="0" y="0"/>
+          <a:chExt cx="0" cy="0"/>
+        </a:xfrm>
+      </p:grpSpPr>
+      <p:pic>
+        <p:nvPicPr>
+          <p:cNvPr id="16" name="Imagen 15">
+            <a:extLst>
+              <a:ext uri="{FF2B5EF4-FFF2-40B4-BE49-F238E27FC236}">
+                <a16:creationId xmlns:a16="http://schemas.microsoft.com/office/drawing/2014/main" id="{BE5E5415-7F99-4CB0-B4AF-14A56C40759B}"/>
+              </a:ext>
+            </a:extLst>
+          </p:cNvPr>
+          <p:cNvPicPr>
+            <a:picLocks noChangeAspect="1"/>
+          </p:cNvPicPr>
+          <p:nvPr/>
+        </p:nvPicPr>
+        <p:blipFill>
+          <a:blip r:embed="rId2">
+            <a:extLst>
+              <a:ext uri="{28A0092B-C50C-407E-A947-70E740481C1C}">
+                <a14:useLocalDpi xmlns:a14="http://schemas.microsoft.com/office/drawing/2010/main" val="0"/>
+              </a:ext>
+            </a:extLst>
+          </a:blip>
+          <a:stretch>
+            <a:fillRect/>
+          </a:stretch>
+        </p:blipFill>
+        <p:spPr>
+          <a:xfrm>
+            <a:off x="3212268" y="18431"/>
+            <a:ext cx="8979732" cy="6858000"/>
+          </a:xfrm>
+          <a:prstGeom prst="rect">
+            <a:avLst/>
+          </a:prstGeom>
+          <a:effectLst>
+            <a:softEdge rad="127000"/>
+          </a:effectLst>
+        </p:spPr>
+      </p:pic>
+      <p:pic>
+        <p:nvPicPr>
+          <p:cNvPr id="7" name="Imagen 6">
+            <a:extLst>
+              <a:ext uri="{FF2B5EF4-FFF2-40B4-BE49-F238E27FC236}">
+                <a16:creationId xmlns:a16="http://schemas.microsoft.com/office/drawing/2014/main" id="{77B5A0BA-FC79-46FB-A558-3D60755755E7}"/>
+              </a:ext>
+            </a:extLst>
+          </p:cNvPr>
+          <p:cNvPicPr>
+            <a:picLocks noChangeAspect="1"/>
+          </p:cNvPicPr>
+          <p:nvPr/>
+        </p:nvPicPr>
+        <p:blipFill>
+          <a:blip r:embed="rId3">
+            <a:extLst>
+              <a:ext uri="{28A0092B-C50C-407E-A947-70E740481C1C}">
+                <a14:useLocalDpi xmlns:a14="http://schemas.microsoft.com/office/drawing/2010/main" val="0"/>
+              </a:ext>
+            </a:extLst>
+          </a:blip>
+          <a:stretch>
+            <a:fillRect/>
+          </a:stretch>
+        </p:blipFill>
+        <p:spPr>
+          <a:xfrm>
+            <a:off x="8139075" y="230819"/>
+            <a:ext cx="3092751" cy="2445706"/>
+          </a:xfrm>
+          <a:prstGeom prst="rect">
+            <a:avLst/>
+          </a:prstGeom>
+          <a:effectLst>
+            <a:softEdge rad="635000"/>
+          </a:effectLst>
+        </p:spPr>
+      </p:pic>
+      <p:pic>
+        <p:nvPicPr>
+          <p:cNvPr id="4" name="Imagen 3">
+            <a:extLst>
+              <a:ext uri="{FF2B5EF4-FFF2-40B4-BE49-F238E27FC236}">
+                <a16:creationId xmlns:a16="http://schemas.microsoft.com/office/drawing/2014/main" id="{58B38A0C-B42E-4855-8354-8D07F2E9331D}"/>
+              </a:ext>
+            </a:extLst>
+          </p:cNvPr>
+          <p:cNvPicPr>
+            <a:picLocks noChangeAspect="1"/>
+          </p:cNvPicPr>
+          <p:nvPr/>
+        </p:nvPicPr>
+        <p:blipFill>
+          <a:blip r:embed="rId4">
+            <a:extLst>
+              <a:ext uri="{28A0092B-C50C-407E-A947-70E740481C1C}">
+                <a14:useLocalDpi xmlns:a14="http://schemas.microsoft.com/office/drawing/2010/main" val="0"/>
+              </a:ext>
+            </a:extLst>
+          </a:blip>
+          <a:stretch>
+            <a:fillRect/>
+          </a:stretch>
+        </p:blipFill>
+        <p:spPr>
+          <a:xfrm>
+            <a:off x="225082" y="3210395"/>
+            <a:ext cx="4305552" cy="3579251"/>
+          </a:xfrm>
+          <a:prstGeom prst="rect">
+            <a:avLst/>
+          </a:prstGeom>
+          <a:solidFill>
+            <a:srgbClr val="000000">
+              <a:shade val="95000"/>
+            </a:srgbClr>
+          </a:solidFill>
+          <a:ln w="444500" cap="sq">
+            <a:noFill/>
+            <a:miter lim="800000"/>
+          </a:ln>
+          <a:effectLst>
+            <a:outerShdw blurRad="254000" dist="190500" dir="2700000" sy="90000" algn="bl" rotWithShape="0">
+              <a:srgbClr val="000000">
+                <a:alpha val="40000"/>
+              </a:srgbClr>
+            </a:outerShdw>
+            <a:softEdge rad="635000"/>
+          </a:effectLst>
+        </p:spPr>
+      </p:pic>
+      <p:sp>
+        <p:nvSpPr>
+          <p:cNvPr id="5" name="Elipse 4">
+            <a:extLst>
+              <a:ext uri="{FF2B5EF4-FFF2-40B4-BE49-F238E27FC236}">
+                <a16:creationId xmlns:a16="http://schemas.microsoft.com/office/drawing/2014/main" id="{6853F6F5-B932-42DE-A945-D38E01D822A9}"/>
+              </a:ext>
+            </a:extLst>
+          </p:cNvPr>
+          <p:cNvSpPr/>
+          <p:nvPr/>
+        </p:nvSpPr>
+        <p:spPr>
+          <a:xfrm>
+            <a:off x="225082" y="230819"/>
+            <a:ext cx="4178060" cy="4358625"/>
+          </a:xfrm>
+          <a:prstGeom prst="ellipse">
+            <a:avLst/>
+          </a:prstGeom>
+          <a:noFill/>
+          <a:ln w="381000" cmpd="thickThin">
+            <a:solidFill>
+              <a:srgbClr val="FFC000"/>
+            </a:solidFill>
+          </a:ln>
+        </p:spPr>
+        <p:style>
+          <a:lnRef idx="0">
+            <a:scrgbClr r="0" g="0" b="0"/>
+          </a:lnRef>
+          <a:fillRef idx="0">
+            <a:scrgbClr r="0" g="0" b="0"/>
+          </a:fillRef>
+          <a:effectRef idx="0">
+            <a:scrgbClr r="0" g="0" b="0"/>
+          </a:effectRef>
+          <a:fontRef idx="minor">
+            <a:schemeClr val="dk1"/>
+          </a:fontRef>
+        </p:style>
+        <p:txBody>
+          <a:bodyPr rtlCol="0" anchor="ctr"/>
+          <a:lstStyle/>
+          <a:p>
+            <a:pPr algn="ctr"/>
+            <a:r>
+              <a:rPr lang="es-PE" sz="20000" b="1" dirty="0">
+                <a:solidFill>
+                  <a:srgbClr val="C00000"/>
+                </a:solidFill>
+                <a:latin typeface="Broadway" panose="04040905080B02020502" pitchFamily="82" charset="0"/>
+              </a:rPr>
+              <a:t>M</a:t>
+            </a:r>
+          </a:p>
+        </p:txBody>
+      </p:sp>
+      <p:pic>
+        <p:nvPicPr>
+          <p:cNvPr id="8" name="Imagen 7">
+            <a:extLst>
+              <a:ext uri="{FF2B5EF4-FFF2-40B4-BE49-F238E27FC236}">
+                <a16:creationId xmlns:a16="http://schemas.microsoft.com/office/drawing/2014/main" id="{0B2A8F33-3DC7-43F1-B52D-607128E791D2}"/>
+              </a:ext>
+            </a:extLst>
+          </p:cNvPr>
+          <p:cNvPicPr>
+            <a:picLocks noChangeAspect="1"/>
+          </p:cNvPicPr>
+          <p:nvPr/>
+        </p:nvPicPr>
+        <p:blipFill rotWithShape="1">
+          <a:blip r:embed="rId5">
+            <a:extLst>
+              <a:ext uri="{BEBA8EAE-BF5A-486C-A8C5-ECC9F3942E4B}">
+                <a14:imgProps xmlns:a14="http://schemas.microsoft.com/office/drawing/2010/main">
+                  <a14:imgLayer r:embed="rId6">
+                    <a14:imgEffect>
+                      <a14:backgroundRemoval t="15344" b="82540" l="4688" r="23633">
+                        <a14:foregroundMark x1="21826" y1="32487" x2="21826" y2="32487"/>
+                        <a14:foregroundMark x1="8350" y1="48466" x2="8350" y2="48466"/>
+                        <a14:foregroundMark x1="10205" y1="51958" x2="10205" y2="51958"/>
+                        <a14:foregroundMark x1="11084" y1="52910" x2="11084" y2="52910"/>
+                        <a14:foregroundMark x1="20361" y1="46667" x2="20361" y2="46667"/>
+                      </a14:backgroundRemoval>
+                    </a14:imgEffect>
+                  </a14:imgLayer>
+                </a14:imgProps>
+              </a:ext>
+              <a:ext uri="{28A0092B-C50C-407E-A947-70E740481C1C}">
+                <a14:useLocalDpi xmlns:a14="http://schemas.microsoft.com/office/drawing/2010/main" val="0"/>
+              </a:ext>
+            </a:extLst>
+          </a:blip>
+          <a:srcRect l="4760" t="14614" r="76496" b="16984"/>
+          <a:stretch/>
+        </p:blipFill>
+        <p:spPr>
+          <a:xfrm>
+            <a:off x="1090258" y="1890038"/>
+            <a:ext cx="902992" cy="1520532"/>
+          </a:xfrm>
+          <a:prstGeom prst="rect">
+            <a:avLst/>
+          </a:prstGeom>
+          <a:ln>
+            <a:noFill/>
+          </a:ln>
+        </p:spPr>
+      </p:pic>
+      <p:sp>
+        <p:nvSpPr>
+          <p:cNvPr id="3" name="CuadroTexto 2">
+            <a:extLst>
+              <a:ext uri="{FF2B5EF4-FFF2-40B4-BE49-F238E27FC236}">
+                <a16:creationId xmlns:a16="http://schemas.microsoft.com/office/drawing/2014/main" id="{ED093A9A-13FD-4718-88F2-7150E7F32F16}"/>
+              </a:ext>
+            </a:extLst>
+          </p:cNvPr>
+          <p:cNvSpPr txBox="1"/>
+          <p:nvPr/>
+        </p:nvSpPr>
+        <p:spPr>
+          <a:xfrm>
+            <a:off x="1444100" y="3676231"/>
+            <a:ext cx="1740024" cy="381740"/>
+          </a:xfrm>
+          <a:prstGeom prst="rect">
+            <a:avLst/>
+          </a:prstGeom>
+          <a:noFill/>
+        </p:spPr>
+        <p:txBody>
+          <a:bodyPr wrap="square" rtlCol="0">
+            <a:spAutoFit/>
+          </a:bodyPr>
+          <a:lstStyle/>
+          <a:p>
+            <a:pPr algn="ctr"/>
+            <a:r>
+              <a:rPr lang="es-PE" dirty="0"/>
+              <a:t>1280 AM</a:t>
+            </a:r>
+          </a:p>
+        </p:txBody>
+      </p:sp>
+    </p:spTree>
+    <p:extLst>
+      <p:ext uri="{BB962C8B-B14F-4D97-AF65-F5344CB8AC3E}">
+        <p14:creationId xmlns:p14="http://schemas.microsoft.com/office/powerpoint/2010/main" val="769494277"/>
       </p:ext>
     </p:extLst>
   </p:cSld>

</xml_diff>

<commit_message>
edición del logo de presentación de radio-moderna
</commit_message>
<xml_diff>
--- a/portafolios/Imagenes-Radio/Logo.pptx
+++ b/portafolios/Imagenes-Radio/Logo.pptx
@@ -11,6 +11,7 @@
     <p:sldId id="259" r:id="rId5"/>
     <p:sldId id="260" r:id="rId6"/>
     <p:sldId id="261" r:id="rId7"/>
+    <p:sldId id="262" r:id="rId8"/>
   </p:sldIdLst>
   <p:sldSz cx="12192000" cy="6858000"/>
   <p:notesSz cx="6858000" cy="9144000"/>
@@ -6854,6 +6855,348 @@
 </p:sld>
 </file>
 
+<file path=ppt/slides/slide7.xml><?xml version="1.0" encoding="utf-8"?>
+<p:sld xmlns:a="http://schemas.openxmlformats.org/drawingml/2006/main" xmlns:r="http://schemas.openxmlformats.org/officeDocument/2006/relationships" xmlns:p="http://schemas.openxmlformats.org/presentationml/2006/main">
+  <p:cSld>
+    <p:spTree>
+      <p:nvGrpSpPr>
+        <p:cNvPr id="1" name=""/>
+        <p:cNvGrpSpPr/>
+        <p:nvPr/>
+      </p:nvGrpSpPr>
+      <p:grpSpPr>
+        <a:xfrm>
+          <a:off x="0" y="0"/>
+          <a:ext cx="0" cy="0"/>
+          <a:chOff x="0" y="0"/>
+          <a:chExt cx="0" cy="0"/>
+        </a:xfrm>
+      </p:grpSpPr>
+      <p:pic>
+        <p:nvPicPr>
+          <p:cNvPr id="12" name="Imagen 11">
+            <a:extLst>
+              <a:ext uri="{FF2B5EF4-FFF2-40B4-BE49-F238E27FC236}">
+                <a16:creationId xmlns:a16="http://schemas.microsoft.com/office/drawing/2014/main" id="{D5075BEA-0A7A-4919-9B28-F49624498D65}"/>
+              </a:ext>
+            </a:extLst>
+          </p:cNvPr>
+          <p:cNvPicPr>
+            <a:picLocks noChangeAspect="1"/>
+          </p:cNvPicPr>
+          <p:nvPr/>
+        </p:nvPicPr>
+        <p:blipFill rotWithShape="1">
+          <a:blip r:embed="rId2">
+            <a:extLst>
+              <a:ext uri="{28A0092B-C50C-407E-A947-70E740481C1C}">
+                <a14:useLocalDpi xmlns:a14="http://schemas.microsoft.com/office/drawing/2010/main" val="0"/>
+              </a:ext>
+            </a:extLst>
+          </a:blip>
+          <a:srcRect l="57680"/>
+          <a:stretch/>
+        </p:blipFill>
+        <p:spPr>
+          <a:xfrm>
+            <a:off x="0" y="0"/>
+            <a:ext cx="4353018" cy="6858000"/>
+          </a:xfrm>
+          <a:prstGeom prst="rect">
+            <a:avLst/>
+          </a:prstGeom>
+          <a:effectLst/>
+        </p:spPr>
+      </p:pic>
+      <p:pic>
+        <p:nvPicPr>
+          <p:cNvPr id="6" name="Imagen 5">
+            <a:extLst>
+              <a:ext uri="{FF2B5EF4-FFF2-40B4-BE49-F238E27FC236}">
+                <a16:creationId xmlns:a16="http://schemas.microsoft.com/office/drawing/2014/main" id="{DA6978BF-F2DF-4A9D-B0A1-F4140CA348C2}"/>
+              </a:ext>
+            </a:extLst>
+          </p:cNvPr>
+          <p:cNvPicPr>
+            <a:picLocks noChangeAspect="1"/>
+          </p:cNvPicPr>
+          <p:nvPr/>
+        </p:nvPicPr>
+        <p:blipFill>
+          <a:blip r:embed="rId2">
+            <a:extLst>
+              <a:ext uri="{28A0092B-C50C-407E-A947-70E740481C1C}">
+                <a14:useLocalDpi xmlns:a14="http://schemas.microsoft.com/office/drawing/2010/main" val="0"/>
+              </a:ext>
+            </a:extLst>
+          </a:blip>
+          <a:stretch>
+            <a:fillRect/>
+          </a:stretch>
+        </p:blipFill>
+        <p:spPr>
+          <a:xfrm>
+            <a:off x="1881694" y="0"/>
+            <a:ext cx="10285892" cy="6858000"/>
+          </a:xfrm>
+          <a:prstGeom prst="rect">
+            <a:avLst/>
+          </a:prstGeom>
+          <a:effectLst/>
+        </p:spPr>
+      </p:pic>
+      <p:sp>
+        <p:nvSpPr>
+          <p:cNvPr id="5" name="Elipse 4">
+            <a:extLst>
+              <a:ext uri="{FF2B5EF4-FFF2-40B4-BE49-F238E27FC236}">
+                <a16:creationId xmlns:a16="http://schemas.microsoft.com/office/drawing/2014/main" id="{6853F6F5-B932-42DE-A945-D38E01D822A9}"/>
+              </a:ext>
+            </a:extLst>
+          </p:cNvPr>
+          <p:cNvSpPr/>
+          <p:nvPr/>
+        </p:nvSpPr>
+        <p:spPr>
+          <a:xfrm>
+            <a:off x="411513" y="337351"/>
+            <a:ext cx="3092751" cy="3198181"/>
+          </a:xfrm>
+          <a:prstGeom prst="ellipse">
+            <a:avLst/>
+          </a:prstGeom>
+          <a:noFill/>
+          <a:ln w="381000" cmpd="thickThin">
+            <a:solidFill>
+              <a:srgbClr val="FFC000"/>
+            </a:solidFill>
+          </a:ln>
+        </p:spPr>
+        <p:style>
+          <a:lnRef idx="0">
+            <a:scrgbClr r="0" g="0" b="0"/>
+          </a:lnRef>
+          <a:fillRef idx="0">
+            <a:scrgbClr r="0" g="0" b="0"/>
+          </a:fillRef>
+          <a:effectRef idx="0">
+            <a:scrgbClr r="0" g="0" b="0"/>
+          </a:effectRef>
+          <a:fontRef idx="minor">
+            <a:schemeClr val="dk1"/>
+          </a:fontRef>
+        </p:style>
+        <p:txBody>
+          <a:bodyPr rtlCol="0" anchor="ctr"/>
+          <a:lstStyle/>
+          <a:p>
+            <a:pPr algn="ctr"/>
+            <a:r>
+              <a:rPr lang="es-PE" sz="18000" b="1" dirty="0">
+                <a:solidFill>
+                  <a:srgbClr val="C00000"/>
+                </a:solidFill>
+                <a:latin typeface="Broadway" panose="04040905080B02020502" pitchFamily="82" charset="0"/>
+              </a:rPr>
+              <a:t>M</a:t>
+            </a:r>
+          </a:p>
+        </p:txBody>
+      </p:sp>
+      <p:pic>
+        <p:nvPicPr>
+          <p:cNvPr id="8" name="Imagen 7">
+            <a:extLst>
+              <a:ext uri="{FF2B5EF4-FFF2-40B4-BE49-F238E27FC236}">
+                <a16:creationId xmlns:a16="http://schemas.microsoft.com/office/drawing/2014/main" id="{0B2A8F33-3DC7-43F1-B52D-607128E791D2}"/>
+              </a:ext>
+            </a:extLst>
+          </p:cNvPr>
+          <p:cNvPicPr>
+            <a:picLocks noChangeAspect="1"/>
+          </p:cNvPicPr>
+          <p:nvPr/>
+        </p:nvPicPr>
+        <p:blipFill rotWithShape="1">
+          <a:blip r:embed="rId3">
+            <a:extLst>
+              <a:ext uri="{BEBA8EAE-BF5A-486C-A8C5-ECC9F3942E4B}">
+                <a14:imgProps xmlns:a14="http://schemas.microsoft.com/office/drawing/2010/main">
+                  <a14:imgLayer r:embed="rId4">
+                    <a14:imgEffect>
+                      <a14:backgroundRemoval t="15344" b="82540" l="4688" r="23633">
+                        <a14:foregroundMark x1="21826" y1="32487" x2="21826" y2="32487"/>
+                        <a14:foregroundMark x1="8350" y1="48466" x2="8350" y2="48466"/>
+                        <a14:foregroundMark x1="10205" y1="51958" x2="10205" y2="51958"/>
+                        <a14:foregroundMark x1="11084" y1="52910" x2="11084" y2="52910"/>
+                        <a14:foregroundMark x1="20361" y1="46667" x2="20361" y2="46667"/>
+                      </a14:backgroundRemoval>
+                    </a14:imgEffect>
+                  </a14:imgLayer>
+                </a14:imgProps>
+              </a:ext>
+              <a:ext uri="{28A0092B-C50C-407E-A947-70E740481C1C}">
+                <a14:useLocalDpi xmlns:a14="http://schemas.microsoft.com/office/drawing/2010/main" val="0"/>
+              </a:ext>
+            </a:extLst>
+          </a:blip>
+          <a:srcRect l="4760" t="14614" r="76496" b="16984"/>
+          <a:stretch/>
+        </p:blipFill>
+        <p:spPr>
+          <a:xfrm>
+            <a:off x="710578" y="1566471"/>
+            <a:ext cx="739656" cy="1245493"/>
+          </a:xfrm>
+          <a:prstGeom prst="rect">
+            <a:avLst/>
+          </a:prstGeom>
+          <a:ln>
+            <a:noFill/>
+          </a:ln>
+        </p:spPr>
+      </p:pic>
+      <p:sp>
+        <p:nvSpPr>
+          <p:cNvPr id="3" name="CuadroTexto 2">
+            <a:extLst>
+              <a:ext uri="{FF2B5EF4-FFF2-40B4-BE49-F238E27FC236}">
+                <a16:creationId xmlns:a16="http://schemas.microsoft.com/office/drawing/2014/main" id="{ED093A9A-13FD-4718-88F2-7150E7F32F16}"/>
+              </a:ext>
+            </a:extLst>
+          </p:cNvPr>
+          <p:cNvSpPr txBox="1"/>
+          <p:nvPr/>
+        </p:nvSpPr>
+        <p:spPr>
+          <a:xfrm>
+            <a:off x="1237681" y="2783057"/>
+            <a:ext cx="1288029" cy="369332"/>
+          </a:xfrm>
+          <a:prstGeom prst="rect">
+            <a:avLst/>
+          </a:prstGeom>
+          <a:noFill/>
+        </p:spPr>
+        <p:txBody>
+          <a:bodyPr wrap="square" rtlCol="0">
+            <a:spAutoFit/>
+          </a:bodyPr>
+          <a:lstStyle/>
+          <a:p>
+            <a:pPr algn="ctr"/>
+            <a:r>
+              <a:rPr lang="es-PE" dirty="0"/>
+              <a:t>1280 AM</a:t>
+            </a:r>
+          </a:p>
+        </p:txBody>
+      </p:sp>
+      <p:pic>
+        <p:nvPicPr>
+          <p:cNvPr id="13" name="Imagen 12">
+            <a:extLst>
+              <a:ext uri="{FF2B5EF4-FFF2-40B4-BE49-F238E27FC236}">
+                <a16:creationId xmlns:a16="http://schemas.microsoft.com/office/drawing/2014/main" id="{EDA564AB-C4E1-4A59-AB30-AB2C099EC687}"/>
+              </a:ext>
+            </a:extLst>
+          </p:cNvPr>
+          <p:cNvPicPr>
+            <a:picLocks noChangeAspect="1"/>
+          </p:cNvPicPr>
+          <p:nvPr/>
+        </p:nvPicPr>
+        <p:blipFill>
+          <a:blip r:embed="rId5">
+            <a:extLst>
+              <a:ext uri="{28A0092B-C50C-407E-A947-70E740481C1C}">
+                <a14:useLocalDpi xmlns:a14="http://schemas.microsoft.com/office/drawing/2010/main" val="0"/>
+              </a:ext>
+            </a:extLst>
+          </a:blip>
+          <a:stretch>
+            <a:fillRect/>
+          </a:stretch>
+        </p:blipFill>
+        <p:spPr>
+          <a:xfrm>
+            <a:off x="3391270" y="4844678"/>
+            <a:ext cx="6800295" cy="2013322"/>
+          </a:xfrm>
+          <a:prstGeom prst="rect">
+            <a:avLst/>
+          </a:prstGeom>
+          <a:solidFill>
+            <a:srgbClr val="000000">
+              <a:shade val="95000"/>
+            </a:srgbClr>
+          </a:solidFill>
+          <a:ln w="444500" cap="sq">
+            <a:noFill/>
+            <a:miter lim="800000"/>
+          </a:ln>
+          <a:effectLst>
+            <a:outerShdw blurRad="254000" dist="190500" dir="2700000" sy="90000" algn="bl" rotWithShape="0">
+              <a:srgbClr val="000000">
+                <a:alpha val="40000"/>
+              </a:srgbClr>
+            </a:outerShdw>
+            <a:softEdge rad="635000"/>
+          </a:effectLst>
+        </p:spPr>
+      </p:pic>
+      <p:pic>
+        <p:nvPicPr>
+          <p:cNvPr id="7" name="Imagen 6">
+            <a:extLst>
+              <a:ext uri="{FF2B5EF4-FFF2-40B4-BE49-F238E27FC236}">
+                <a16:creationId xmlns:a16="http://schemas.microsoft.com/office/drawing/2014/main" id="{77B5A0BA-FC79-46FB-A558-3D60755755E7}"/>
+              </a:ext>
+            </a:extLst>
+          </p:cNvPr>
+          <p:cNvPicPr>
+            <a:picLocks noChangeAspect="1"/>
+          </p:cNvPicPr>
+          <p:nvPr/>
+        </p:nvPicPr>
+        <p:blipFill>
+          <a:blip r:embed="rId6">
+            <a:extLst>
+              <a:ext uri="{28A0092B-C50C-407E-A947-70E740481C1C}">
+                <a14:useLocalDpi xmlns:a14="http://schemas.microsoft.com/office/drawing/2010/main" val="0"/>
+              </a:ext>
+            </a:extLst>
+          </a:blip>
+          <a:stretch>
+            <a:fillRect/>
+          </a:stretch>
+        </p:blipFill>
+        <p:spPr>
+          <a:xfrm>
+            <a:off x="9004764" y="4356882"/>
+            <a:ext cx="3162822" cy="2501118"/>
+          </a:xfrm>
+          <a:prstGeom prst="rect">
+            <a:avLst/>
+          </a:prstGeom>
+          <a:effectLst>
+            <a:softEdge rad="635000"/>
+          </a:effectLst>
+        </p:spPr>
+      </p:pic>
+    </p:spTree>
+    <p:extLst>
+      <p:ext uri="{BB962C8B-B14F-4D97-AF65-F5344CB8AC3E}">
+        <p14:creationId xmlns:p14="http://schemas.microsoft.com/office/powerpoint/2010/main" val="2585346490"/>
+      </p:ext>
+    </p:extLst>
+  </p:cSld>
+  <p:clrMapOvr>
+    <a:masterClrMapping/>
+  </p:clrMapOvr>
+</p:sld>
+</file>
+
 <file path=ppt/theme/theme1.xml><?xml version="1.0" encoding="utf-8"?>
 <a:theme xmlns:a="http://schemas.openxmlformats.org/drawingml/2006/main" name="Damask">
   <a:themeElements>

</xml_diff>